<commit_message>
update notebook and ppt
</commit_message>
<xml_diff>
--- a/Proj2/docs/IA-T10-G27-FinalDelivery.pptx
+++ b/Proj2/docs/IA-T10-G27-FinalDelivery.pptx
@@ -10649,7 +10649,7 @@
                 </a:solidFill>
                 <a:latin typeface="Inter"/>
               </a:rPr>
-              <a:t>… (</a:t>
+              <a:t> </a:t>
             </a:r>
             <a:r>
               <a:rPr lang="en-US" b="0" i="0" dirty="0">
@@ -10659,27 +10659,14 @@
                 <a:effectLst/>
                 <a:latin typeface="Inter"/>
               </a:rPr>
-              <a:t>they could represent flights with the same delay time or flights </a:t>
-            </a:r>
-            <a:r>
-              <a:rPr lang="en-US" dirty="0">
-                <a:solidFill>
-                  <a:srgbClr val="263238"/>
-                </a:solidFill>
-                <a:latin typeface="Inter"/>
-              </a:rPr>
-              <a:t>with </a:t>
-            </a:r>
-            <a:r>
-              <a:rPr lang="en-US" b="0" i="0" dirty="0">
-                <a:solidFill>
-                  <a:srgbClr val="263238"/>
-                </a:solidFill>
-                <a:effectLst/>
-                <a:latin typeface="Inter"/>
-              </a:rPr>
-              <a:t>multiple delays).</a:t>
-            </a:r>
+              <a:t>they could represent regularly scheduled flights that are usually on time/delayed.</a:t>
+            </a:r>
+            <a:endParaRPr lang="en-US" dirty="0">
+              <a:solidFill>
+                <a:srgbClr val="263238"/>
+              </a:solidFill>
+              <a:latin typeface="Inter"/>
+            </a:endParaRPr>
           </a:p>
           <a:p>
             <a:pPr marL="285750" lvl="0" indent="-285750" algn="just" rtl="0">
@@ -10696,254 +10683,54 @@
               <a:buChar char="•"/>
             </a:pPr>
             <a:r>
-              <a:rPr lang="pt-PT" dirty="0" err="1">
-                <a:latin typeface="Inter"/>
-              </a:rPr>
-              <a:t>There</a:t>
-            </a:r>
-            <a:r>
-              <a:rPr lang="pt-PT" dirty="0">
-                <a:latin typeface="Inter"/>
-              </a:rPr>
-              <a:t> are some </a:t>
-            </a:r>
-            <a:r>
-              <a:rPr lang="pt-PT" b="1" dirty="0" err="1">
-                <a:latin typeface="Inter"/>
+              <a:rPr lang="en-US" b="0" i="0" dirty="0">
+                <a:solidFill>
+                  <a:srgbClr val="263238"/>
+                </a:solidFill>
+                <a:effectLst/>
+                <a:latin typeface="inherit"/>
+              </a:rPr>
+              <a:t>There are few (&lt;5%) </a:t>
+            </a:r>
+            <a:r>
+              <a:rPr lang="en-US" b="1" i="0" dirty="0">
+                <a:solidFill>
+                  <a:srgbClr val="263238"/>
+                </a:solidFill>
+                <a:effectLst/>
+                <a:latin typeface="inherit"/>
               </a:rPr>
               <a:t>outliers</a:t>
             </a:r>
             <a:r>
-              <a:rPr lang="pt-PT" dirty="0">
-                <a:latin typeface="Inter"/>
-              </a:rPr>
-              <a:t> in ‘</a:t>
-            </a:r>
-            <a:r>
-              <a:rPr lang="pt-PT" dirty="0" err="1">
-                <a:latin typeface="Inter"/>
-              </a:rPr>
-              <a:t>Length</a:t>
-            </a:r>
-            <a:r>
-              <a:rPr lang="pt-PT" dirty="0">
-                <a:latin typeface="Inter"/>
-              </a:rPr>
-              <a:t>’ </a:t>
-            </a:r>
-            <a:r>
-              <a:rPr lang="pt-PT" dirty="0" err="1">
-                <a:latin typeface="Inter"/>
-              </a:rPr>
-              <a:t>but</a:t>
-            </a:r>
-            <a:r>
-              <a:rPr lang="pt-PT" dirty="0">
-                <a:latin typeface="Inter"/>
+              <a:rPr lang="en-US" b="0" i="0" dirty="0">
+                <a:solidFill>
+                  <a:srgbClr val="263238"/>
+                </a:solidFill>
+                <a:effectLst/>
+                <a:latin typeface="inherit"/>
+              </a:rPr>
+              <a:t> in ‘Length’,</a:t>
+            </a:r>
+            <a:r>
+              <a:rPr lang="en-US" dirty="0">
+                <a:solidFill>
+                  <a:srgbClr val="263238"/>
+                </a:solidFill>
+                <a:latin typeface="inherit"/>
               </a:rPr>
               <a:t> </a:t>
             </a:r>
             <a:r>
-              <a:rPr lang="pt-PT" dirty="0" err="1">
-                <a:latin typeface="Inter"/>
-              </a:rPr>
-              <a:t>they</a:t>
-            </a:r>
-            <a:r>
-              <a:rPr lang="pt-PT" dirty="0">
-                <a:latin typeface="Inter"/>
-              </a:rPr>
-              <a:t> </a:t>
-            </a:r>
-            <a:r>
-              <a:rPr lang="pt-PT" dirty="0" err="1">
-                <a:latin typeface="Inter"/>
-              </a:rPr>
-              <a:t>don’t</a:t>
-            </a:r>
-            <a:r>
-              <a:rPr lang="pt-PT" dirty="0">
-                <a:latin typeface="Inter"/>
-              </a:rPr>
-              <a:t> </a:t>
-            </a:r>
-            <a:r>
-              <a:rPr lang="pt-PT" dirty="0" err="1">
-                <a:latin typeface="Inter"/>
-              </a:rPr>
-              <a:t>represent</a:t>
-            </a:r>
-            <a:r>
-              <a:rPr lang="pt-PT" dirty="0">
-                <a:latin typeface="Inter"/>
-              </a:rPr>
-              <a:t> </a:t>
-            </a:r>
-            <a:r>
-              <a:rPr lang="pt-PT" dirty="0" err="1">
-                <a:latin typeface="Inter"/>
-              </a:rPr>
-              <a:t>errors</a:t>
-            </a:r>
-            <a:r>
-              <a:rPr lang="pt-PT" dirty="0">
-                <a:latin typeface="Inter"/>
-              </a:rPr>
-              <a:t> </a:t>
-            </a:r>
-            <a:r>
-              <a:rPr lang="pt-PT" dirty="0" err="1">
-                <a:latin typeface="Inter"/>
-              </a:rPr>
-              <a:t>since</a:t>
-            </a:r>
-            <a:r>
-              <a:rPr lang="pt-PT" dirty="0">
-                <a:latin typeface="Inter"/>
-              </a:rPr>
-              <a:t> </a:t>
-            </a:r>
-            <a:r>
-              <a:rPr lang="pt-PT" dirty="0" err="1">
-                <a:latin typeface="Inter"/>
-              </a:rPr>
-              <a:t>most</a:t>
-            </a:r>
-            <a:r>
-              <a:rPr lang="pt-PT" dirty="0">
-                <a:latin typeface="Inter"/>
-              </a:rPr>
-              <a:t> </a:t>
-            </a:r>
-            <a:r>
-              <a:rPr lang="pt-PT" dirty="0" err="1">
-                <a:latin typeface="Inter"/>
-              </a:rPr>
-              <a:t>likely</a:t>
-            </a:r>
-            <a:r>
-              <a:rPr lang="pt-PT" dirty="0">
-                <a:latin typeface="Inter"/>
-              </a:rPr>
-              <a:t> </a:t>
-            </a:r>
-            <a:r>
-              <a:rPr lang="pt-PT" dirty="0" err="1">
-                <a:latin typeface="Inter"/>
-              </a:rPr>
-              <a:t>we</a:t>
-            </a:r>
-            <a:r>
-              <a:rPr lang="pt-PT" dirty="0">
-                <a:latin typeface="Inter"/>
-              </a:rPr>
-              <a:t> </a:t>
-            </a:r>
-            <a:r>
-              <a:rPr lang="pt-PT" dirty="0" err="1">
-                <a:latin typeface="Inter"/>
-              </a:rPr>
-              <a:t>will</a:t>
-            </a:r>
-            <a:r>
-              <a:rPr lang="pt-PT" dirty="0">
-                <a:latin typeface="Inter"/>
-              </a:rPr>
-              <a:t> </a:t>
-            </a:r>
-            <a:r>
-              <a:rPr lang="pt-PT" dirty="0" err="1">
-                <a:latin typeface="Inter"/>
-              </a:rPr>
-              <a:t>be</a:t>
-            </a:r>
-            <a:r>
-              <a:rPr lang="pt-PT" dirty="0">
-                <a:latin typeface="Inter"/>
-              </a:rPr>
-              <a:t> </a:t>
-            </a:r>
-            <a:r>
-              <a:rPr lang="pt-PT" dirty="0" err="1">
-                <a:latin typeface="Inter"/>
-              </a:rPr>
-              <a:t>removing</a:t>
-            </a:r>
-            <a:r>
-              <a:rPr lang="pt-PT" dirty="0">
-                <a:latin typeface="Inter"/>
-              </a:rPr>
-              <a:t> </a:t>
-            </a:r>
-            <a:r>
-              <a:rPr lang="pt-PT" dirty="0" err="1">
-                <a:latin typeface="Inter"/>
-              </a:rPr>
-              <a:t>the</a:t>
-            </a:r>
-            <a:r>
-              <a:rPr lang="pt-PT" dirty="0">
-                <a:latin typeface="Inter"/>
-              </a:rPr>
-              <a:t> </a:t>
-            </a:r>
-            <a:r>
-              <a:rPr lang="pt-PT" dirty="0" err="1">
-                <a:latin typeface="Inter"/>
-              </a:rPr>
-              <a:t>exact</a:t>
-            </a:r>
-            <a:r>
-              <a:rPr lang="pt-PT" dirty="0">
-                <a:latin typeface="Inter"/>
-              </a:rPr>
-              <a:t> </a:t>
-            </a:r>
-            <a:r>
-              <a:rPr lang="pt-PT" dirty="0" err="1">
-                <a:latin typeface="Inter"/>
-              </a:rPr>
-              <a:t>object</a:t>
-            </a:r>
-            <a:r>
-              <a:rPr lang="pt-PT" dirty="0">
-                <a:latin typeface="Inter"/>
-              </a:rPr>
-              <a:t> </a:t>
-            </a:r>
-            <a:r>
-              <a:rPr lang="pt-PT" dirty="0" err="1">
-                <a:latin typeface="Inter"/>
-              </a:rPr>
-              <a:t>of</a:t>
-            </a:r>
-            <a:r>
-              <a:rPr lang="pt-PT" dirty="0">
-                <a:latin typeface="Inter"/>
-              </a:rPr>
-              <a:t> </a:t>
-            </a:r>
-            <a:r>
-              <a:rPr lang="pt-PT" dirty="0" err="1">
-                <a:latin typeface="Inter"/>
-              </a:rPr>
-              <a:t>our</a:t>
-            </a:r>
-            <a:r>
-              <a:rPr lang="pt-PT" dirty="0">
-                <a:latin typeface="Inter"/>
-              </a:rPr>
-              <a:t> </a:t>
-            </a:r>
-            <a:r>
-              <a:rPr lang="pt-PT" dirty="0" err="1">
-                <a:latin typeface="Inter"/>
-              </a:rPr>
-              <a:t>analysis</a:t>
-            </a:r>
-            <a:endParaRPr lang="pt-PT" dirty="0">
-              <a:latin typeface="Inter"/>
-            </a:endParaRPr>
+              <a:rPr lang="en-US" b="0" i="0" dirty="0">
+                <a:solidFill>
+                  <a:srgbClr val="263238"/>
+                </a:solidFill>
+                <a:effectLst/>
+                <a:latin typeface="inherit"/>
+              </a:rPr>
+              <a:t>but they don’t necessarily represent errors, just very long flights, and so we choose not to remove them.</a:t>
+            </a:r>
           </a:p>
         </p:txBody>
       </p:sp>
@@ -11167,8 +10954,8 @@
         </p:nvSpPr>
         <p:spPr>
           <a:xfrm>
-            <a:off x="719997" y="1836043"/>
-            <a:ext cx="3852003" cy="1265837"/>
+            <a:off x="719997" y="1836044"/>
+            <a:ext cx="3973655" cy="1026604"/>
           </a:xfrm>
           <a:prstGeom prst="rect">
             <a:avLst/>
@@ -11180,21 +10967,15 @@
           </a:bodyPr>
           <a:lstStyle/>
           <a:p>
-            <a:pPr marL="285750" lvl="0" indent="-285750" algn="l" rtl="0">
-              <a:spcBef>
-                <a:spcPts val="0"/>
-              </a:spcBef>
-              <a:spcAft>
-                <a:spcPts val="0"/>
-              </a:spcAft>
+            <a:pPr marL="285750" indent="-285750" algn="just">
               <a:buFont typeface="Arial" panose="020B0604020202020204" pitchFamily="34" charset="0"/>
               <a:buChar char="•"/>
             </a:pPr>
             <a:r>
-              <a:rPr lang="en" dirty="0">
-                <a:latin typeface="Inter"/>
-              </a:rPr>
-              <a:t>To classify this model, </a:t>
+              <a:rPr lang="en-US" dirty="0">
+                <a:latin typeface="Inter"/>
+              </a:rPr>
+              <a:t>This model was based on the implementation of the </a:t>
             </a:r>
             <a:r>
               <a:rPr lang="pt-PT" b="1" dirty="0" err="1">
@@ -11203,7 +10984,19 @@
               <a:t>DecisionTreeClassifier</a:t>
             </a:r>
             <a:r>
-              <a:rPr lang="pt-PT" dirty="0">
+              <a:rPr lang="en-US" dirty="0">
+                <a:latin typeface="Inter"/>
+              </a:rPr>
+              <a:t> from the </a:t>
+            </a:r>
+            <a:r>
+              <a:rPr lang="en-US" b="1" dirty="0" err="1">
+                <a:latin typeface="Inter"/>
+              </a:rPr>
+              <a:t>sklearn.tree</a:t>
+            </a:r>
+            <a:r>
+              <a:rPr lang="en-US" b="1" dirty="0">
                 <a:latin typeface="Inter"/>
               </a:rPr>
               <a:t> </a:t>
@@ -11212,32 +11005,11 @@
               <a:rPr lang="en-US" dirty="0">
                 <a:latin typeface="Inter"/>
               </a:rPr>
-              <a:t>relative to the </a:t>
-            </a:r>
-            <a:r>
-              <a:rPr lang="en-US" b="1" dirty="0" err="1">
-                <a:latin typeface="Inter"/>
-              </a:rPr>
-              <a:t>sklearn.tree</a:t>
-            </a:r>
-            <a:r>
-              <a:rPr lang="en-US" b="1" dirty="0">
-                <a:latin typeface="Inter"/>
-              </a:rPr>
-              <a:t> </a:t>
-            </a:r>
-            <a:r>
-              <a:rPr lang="en-US" dirty="0">
-                <a:latin typeface="Inter"/>
-              </a:rPr>
-              <a:t>module was used. </a:t>
-            </a:r>
-            <a:endParaRPr lang="en" dirty="0">
-              <a:latin typeface="Inter"/>
-            </a:endParaRPr>
+              <a:t>module.</a:t>
+            </a:r>
           </a:p>
           <a:p>
-            <a:pPr marL="285750" lvl="0" indent="-285750" algn="l" rtl="0">
+            <a:pPr marL="285750" lvl="0" indent="-285750" algn="just" rtl="0">
               <a:spcBef>
                 <a:spcPts val="0"/>
               </a:spcBef>
@@ -11281,7 +11053,7 @@
         </p:nvSpPr>
         <p:spPr>
           <a:xfrm>
-            <a:off x="5136998" y="1464644"/>
+            <a:off x="719997" y="3101881"/>
             <a:ext cx="3092601" cy="371400"/>
           </a:xfrm>
           <a:prstGeom prst="rect">
@@ -11607,8 +11379,8 @@
         </p:nvSpPr>
         <p:spPr>
           <a:xfrm>
-            <a:off x="5136998" y="1816167"/>
-            <a:ext cx="3535947" cy="1285714"/>
+            <a:off x="719998" y="3453404"/>
+            <a:ext cx="3799184" cy="1423396"/>
           </a:xfrm>
           <a:prstGeom prst="rect">
             <a:avLst/>
@@ -11878,31 +11650,37 @@
               <a:rPr lang="en-US" dirty="0">
                 <a:latin typeface="Inter"/>
               </a:rPr>
-              <a:t>The </a:t>
+              <a:t>This model was based on the implementation of the </a:t>
+            </a:r>
+            <a:r>
+              <a:rPr lang="en-US" b="1" dirty="0">
+                <a:latin typeface="Inter"/>
+              </a:rPr>
+              <a:t>SVC</a:t>
+            </a:r>
+            <a:r>
+              <a:rPr lang="en-US" dirty="0">
+                <a:latin typeface="Inter"/>
+              </a:rPr>
+              <a:t> from the </a:t>
             </a:r>
             <a:r>
               <a:rPr lang="en-US" b="1" dirty="0" err="1">
                 <a:latin typeface="Inter"/>
               </a:rPr>
-              <a:t>sklearn</a:t>
+              <a:t>sklearn.svm</a:t>
+            </a:r>
+            <a:r>
+              <a:rPr lang="en-US" b="1" dirty="0">
+                <a:latin typeface="Inter"/>
+              </a:rPr>
+              <a:t> </a:t>
             </a:r>
             <a:r>
               <a:rPr lang="en-US" dirty="0">
                 <a:latin typeface="Inter"/>
               </a:rPr>
-              <a:t> module </a:t>
-            </a:r>
-            <a:r>
-              <a:rPr lang="en-US" b="1" dirty="0" err="1">
-                <a:latin typeface="Inter"/>
-              </a:rPr>
-              <a:t>svm</a:t>
-            </a:r>
-            <a:r>
-              <a:rPr lang="en-US" dirty="0">
-                <a:latin typeface="Inter"/>
-              </a:rPr>
-              <a:t> was used.</a:t>
+              <a:t>module.</a:t>
             </a:r>
           </a:p>
           <a:p>
@@ -11940,647 +11718,6 @@
               </a:rPr>
               <a:t>'</a:t>
             </a:r>
-          </a:p>
-        </p:txBody>
-      </p:sp>
-      <p:sp>
-        <p:nvSpPr>
-          <p:cNvPr id="2" name="Google Shape;242;p28">
-            <a:extLst>
-              <a:ext uri="{FF2B5EF4-FFF2-40B4-BE49-F238E27FC236}">
-                <a16:creationId xmlns:a16="http://schemas.microsoft.com/office/drawing/2014/main" id="{86607180-01D7-A59B-1B53-14066DBCA657}"/>
-              </a:ext>
-            </a:extLst>
-          </p:cNvPr>
-          <p:cNvSpPr txBox="1">
-            <a:spLocks/>
-          </p:cNvSpPr>
-          <p:nvPr/>
-        </p:nvSpPr>
-        <p:spPr>
-          <a:xfrm>
-            <a:off x="719993" y="3121757"/>
-            <a:ext cx="2869022" cy="371400"/>
-          </a:xfrm>
-          <a:prstGeom prst="rect">
-            <a:avLst/>
-          </a:prstGeom>
-          <a:noFill/>
-          <a:ln>
-            <a:noFill/>
-          </a:ln>
-        </p:spPr>
-        <p:txBody>
-          <a:bodyPr spcFirstLastPara="1" wrap="square" lIns="91425" tIns="91425" rIns="91425" bIns="91425" anchor="t" anchorCtr="0">
-            <a:noAutofit/>
-          </a:bodyPr>
-          <a:lstStyle>
-            <a:defPPr marR="0" lvl="0" algn="l" rtl="0">
-              <a:lnSpc>
-                <a:spcPct val="100000"/>
-              </a:lnSpc>
-              <a:spcBef>
-                <a:spcPts val="0"/>
-              </a:spcBef>
-              <a:spcAft>
-                <a:spcPts val="0"/>
-              </a:spcAft>
-            </a:defPPr>
-            <a:lvl1pPr marL="457200" marR="0" lvl="0" indent="-342900" algn="l" rtl="0">
-              <a:lnSpc>
-                <a:spcPct val="100000"/>
-              </a:lnSpc>
-              <a:spcBef>
-                <a:spcPts val="0"/>
-              </a:spcBef>
-              <a:spcAft>
-                <a:spcPts val="0"/>
-              </a:spcAft>
-              <a:buClr>
-                <a:schemeClr val="dk1"/>
-              </a:buClr>
-              <a:buSzPts val="1800"/>
-              <a:buFont typeface="Poppins"/>
-              <a:buNone/>
-              <a:defRPr sz="1800" b="0" i="0" u="none" strike="noStrike" cap="none">
-                <a:solidFill>
-                  <a:schemeClr val="dk1"/>
-                </a:solidFill>
-                <a:latin typeface="Poppins Black"/>
-                <a:ea typeface="Poppins Black"/>
-                <a:cs typeface="Poppins Black"/>
-                <a:sym typeface="Poppins Black"/>
-              </a:defRPr>
-            </a:lvl1pPr>
-            <a:lvl2pPr marL="914400" marR="0" lvl="1" indent="-317500" algn="l" rtl="0">
-              <a:lnSpc>
-                <a:spcPct val="100000"/>
-              </a:lnSpc>
-              <a:spcBef>
-                <a:spcPts val="1600"/>
-              </a:spcBef>
-              <a:spcAft>
-                <a:spcPts val="0"/>
-              </a:spcAft>
-              <a:buClr>
-                <a:schemeClr val="dk1"/>
-              </a:buClr>
-              <a:buSzPts val="1400"/>
-              <a:buFont typeface="Poppins"/>
-              <a:buNone/>
-              <a:defRPr sz="1400" b="0" i="0" u="none" strike="noStrike" cap="none">
-                <a:solidFill>
-                  <a:schemeClr val="dk1"/>
-                </a:solidFill>
-                <a:latin typeface="Poppins Black"/>
-                <a:ea typeface="Poppins Black"/>
-                <a:cs typeface="Poppins Black"/>
-                <a:sym typeface="Poppins Black"/>
-              </a:defRPr>
-            </a:lvl2pPr>
-            <a:lvl3pPr marL="1371600" marR="0" lvl="2" indent="-317500" algn="l" rtl="0">
-              <a:lnSpc>
-                <a:spcPct val="100000"/>
-              </a:lnSpc>
-              <a:spcBef>
-                <a:spcPts val="1600"/>
-              </a:spcBef>
-              <a:spcAft>
-                <a:spcPts val="0"/>
-              </a:spcAft>
-              <a:buClr>
-                <a:schemeClr val="dk1"/>
-              </a:buClr>
-              <a:buSzPts val="1400"/>
-              <a:buFont typeface="Poppins"/>
-              <a:buNone/>
-              <a:defRPr sz="1400" b="0" i="0" u="none" strike="noStrike" cap="none">
-                <a:solidFill>
-                  <a:schemeClr val="dk1"/>
-                </a:solidFill>
-                <a:latin typeface="Poppins Black"/>
-                <a:ea typeface="Poppins Black"/>
-                <a:cs typeface="Poppins Black"/>
-                <a:sym typeface="Poppins Black"/>
-              </a:defRPr>
-            </a:lvl3pPr>
-            <a:lvl4pPr marL="1828800" marR="0" lvl="3" indent="-317500" algn="l" rtl="0">
-              <a:lnSpc>
-                <a:spcPct val="100000"/>
-              </a:lnSpc>
-              <a:spcBef>
-                <a:spcPts val="1600"/>
-              </a:spcBef>
-              <a:spcAft>
-                <a:spcPts val="0"/>
-              </a:spcAft>
-              <a:buClr>
-                <a:schemeClr val="dk1"/>
-              </a:buClr>
-              <a:buSzPts val="1400"/>
-              <a:buFont typeface="Poppins"/>
-              <a:buNone/>
-              <a:defRPr sz="1400" b="0" i="0" u="none" strike="noStrike" cap="none">
-                <a:solidFill>
-                  <a:schemeClr val="dk1"/>
-                </a:solidFill>
-                <a:latin typeface="Poppins Black"/>
-                <a:ea typeface="Poppins Black"/>
-                <a:cs typeface="Poppins Black"/>
-                <a:sym typeface="Poppins Black"/>
-              </a:defRPr>
-            </a:lvl4pPr>
-            <a:lvl5pPr marL="2286000" marR="0" lvl="4" indent="-317500" algn="l" rtl="0">
-              <a:lnSpc>
-                <a:spcPct val="100000"/>
-              </a:lnSpc>
-              <a:spcBef>
-                <a:spcPts val="1600"/>
-              </a:spcBef>
-              <a:spcAft>
-                <a:spcPts val="0"/>
-              </a:spcAft>
-              <a:buClr>
-                <a:schemeClr val="dk1"/>
-              </a:buClr>
-              <a:buSzPts val="1400"/>
-              <a:buFont typeface="Poppins"/>
-              <a:buNone/>
-              <a:defRPr sz="1400" b="0" i="0" u="none" strike="noStrike" cap="none">
-                <a:solidFill>
-                  <a:schemeClr val="dk1"/>
-                </a:solidFill>
-                <a:latin typeface="Poppins Black"/>
-                <a:ea typeface="Poppins Black"/>
-                <a:cs typeface="Poppins Black"/>
-                <a:sym typeface="Poppins Black"/>
-              </a:defRPr>
-            </a:lvl5pPr>
-            <a:lvl6pPr marL="2743200" marR="0" lvl="5" indent="-317500" algn="l" rtl="0">
-              <a:lnSpc>
-                <a:spcPct val="100000"/>
-              </a:lnSpc>
-              <a:spcBef>
-                <a:spcPts val="1600"/>
-              </a:spcBef>
-              <a:spcAft>
-                <a:spcPts val="0"/>
-              </a:spcAft>
-              <a:buClr>
-                <a:schemeClr val="dk1"/>
-              </a:buClr>
-              <a:buSzPts val="1400"/>
-              <a:buFont typeface="Poppins"/>
-              <a:buNone/>
-              <a:defRPr sz="1400" b="0" i="0" u="none" strike="noStrike" cap="none">
-                <a:solidFill>
-                  <a:schemeClr val="dk1"/>
-                </a:solidFill>
-                <a:latin typeface="Poppins Black"/>
-                <a:ea typeface="Poppins Black"/>
-                <a:cs typeface="Poppins Black"/>
-                <a:sym typeface="Poppins Black"/>
-              </a:defRPr>
-            </a:lvl6pPr>
-            <a:lvl7pPr marL="3200400" marR="0" lvl="6" indent="-317500" algn="l" rtl="0">
-              <a:lnSpc>
-                <a:spcPct val="100000"/>
-              </a:lnSpc>
-              <a:spcBef>
-                <a:spcPts val="1600"/>
-              </a:spcBef>
-              <a:spcAft>
-                <a:spcPts val="0"/>
-              </a:spcAft>
-              <a:buClr>
-                <a:schemeClr val="dk1"/>
-              </a:buClr>
-              <a:buSzPts val="1400"/>
-              <a:buFont typeface="Poppins"/>
-              <a:buNone/>
-              <a:defRPr sz="1400" b="0" i="0" u="none" strike="noStrike" cap="none">
-                <a:solidFill>
-                  <a:schemeClr val="dk1"/>
-                </a:solidFill>
-                <a:latin typeface="Poppins Black"/>
-                <a:ea typeface="Poppins Black"/>
-                <a:cs typeface="Poppins Black"/>
-                <a:sym typeface="Poppins Black"/>
-              </a:defRPr>
-            </a:lvl7pPr>
-            <a:lvl8pPr marL="3657600" marR="0" lvl="7" indent="-317500" algn="l" rtl="0">
-              <a:lnSpc>
-                <a:spcPct val="100000"/>
-              </a:lnSpc>
-              <a:spcBef>
-                <a:spcPts val="1600"/>
-              </a:spcBef>
-              <a:spcAft>
-                <a:spcPts val="0"/>
-              </a:spcAft>
-              <a:buClr>
-                <a:schemeClr val="dk1"/>
-              </a:buClr>
-              <a:buSzPts val="1400"/>
-              <a:buFont typeface="Poppins"/>
-              <a:buNone/>
-              <a:defRPr sz="1400" b="0" i="0" u="none" strike="noStrike" cap="none">
-                <a:solidFill>
-                  <a:schemeClr val="dk1"/>
-                </a:solidFill>
-                <a:latin typeface="Poppins Black"/>
-                <a:ea typeface="Poppins Black"/>
-                <a:cs typeface="Poppins Black"/>
-                <a:sym typeface="Poppins Black"/>
-              </a:defRPr>
-            </a:lvl8pPr>
-            <a:lvl9pPr marL="4114800" marR="0" lvl="8" indent="-317500" algn="l" rtl="0">
-              <a:lnSpc>
-                <a:spcPct val="100000"/>
-              </a:lnSpc>
-              <a:spcBef>
-                <a:spcPts val="1600"/>
-              </a:spcBef>
-              <a:spcAft>
-                <a:spcPts val="1600"/>
-              </a:spcAft>
-              <a:buClr>
-                <a:schemeClr val="dk1"/>
-              </a:buClr>
-              <a:buSzPts val="1400"/>
-              <a:buFont typeface="Poppins"/>
-              <a:buNone/>
-              <a:defRPr sz="1400" b="0" i="0" u="none" strike="noStrike" cap="none">
-                <a:solidFill>
-                  <a:schemeClr val="dk1"/>
-                </a:solidFill>
-                <a:latin typeface="Poppins Black"/>
-                <a:ea typeface="Poppins Black"/>
-                <a:cs typeface="Poppins Black"/>
-                <a:sym typeface="Poppins Black"/>
-              </a:defRPr>
-            </a:lvl9pPr>
-          </a:lstStyle>
-          <a:p>
-            <a:pPr marL="0" indent="0">
-              <a:spcAft>
-                <a:spcPts val="1600"/>
-              </a:spcAft>
-            </a:pPr>
-            <a:r>
-              <a:rPr lang="pt-PT">
-                <a:latin typeface="Poppins" panose="00000500000000000000" pitchFamily="2" charset="0"/>
-                <a:cs typeface="Poppins" panose="00000500000000000000" pitchFamily="2" charset="0"/>
-              </a:rPr>
-              <a:t>K-Nearest Neightbours</a:t>
-            </a:r>
-            <a:endParaRPr lang="pt-PT" dirty="0">
-              <a:latin typeface="Poppins" panose="00000500000000000000" pitchFamily="2" charset="0"/>
-              <a:cs typeface="Poppins" panose="00000500000000000000" pitchFamily="2" charset="0"/>
-            </a:endParaRPr>
-          </a:p>
-        </p:txBody>
-      </p:sp>
-      <p:sp>
-        <p:nvSpPr>
-          <p:cNvPr id="3" name="Google Shape;244;p28">
-            <a:extLst>
-              <a:ext uri="{FF2B5EF4-FFF2-40B4-BE49-F238E27FC236}">
-                <a16:creationId xmlns:a16="http://schemas.microsoft.com/office/drawing/2014/main" id="{C2F98797-D09C-FEB9-DAC0-37640CEC82CD}"/>
-              </a:ext>
-            </a:extLst>
-          </p:cNvPr>
-          <p:cNvSpPr txBox="1">
-            <a:spLocks/>
-          </p:cNvSpPr>
-          <p:nvPr/>
-        </p:nvSpPr>
-        <p:spPr>
-          <a:xfrm>
-            <a:off x="719994" y="3473281"/>
-            <a:ext cx="3616480" cy="1026604"/>
-          </a:xfrm>
-          <a:prstGeom prst="rect">
-            <a:avLst/>
-          </a:prstGeom>
-          <a:noFill/>
-          <a:ln>
-            <a:noFill/>
-          </a:ln>
-        </p:spPr>
-        <p:txBody>
-          <a:bodyPr spcFirstLastPara="1" wrap="square" lIns="91425" tIns="91425" rIns="91425" bIns="91425" anchor="t" anchorCtr="0">
-            <a:noAutofit/>
-          </a:bodyPr>
-          <a:lstStyle>
-            <a:defPPr marR="0" lvl="0" algn="l" rtl="0">
-              <a:lnSpc>
-                <a:spcPct val="100000"/>
-              </a:lnSpc>
-              <a:spcBef>
-                <a:spcPts val="0"/>
-              </a:spcBef>
-              <a:spcAft>
-                <a:spcPts val="0"/>
-              </a:spcAft>
-            </a:defPPr>
-            <a:lvl1pPr marL="457200" marR="0" lvl="0" indent="-342900" algn="l" rtl="0">
-              <a:lnSpc>
-                <a:spcPct val="100000"/>
-              </a:lnSpc>
-              <a:spcBef>
-                <a:spcPts val="0"/>
-              </a:spcBef>
-              <a:spcAft>
-                <a:spcPts val="0"/>
-              </a:spcAft>
-              <a:buClr>
-                <a:schemeClr val="dk1"/>
-              </a:buClr>
-              <a:buSzPts val="1800"/>
-              <a:buFont typeface="Poppins"/>
-              <a:buNone/>
-              <a:defRPr sz="1400" b="0" i="0" u="none" strike="noStrike" cap="none">
-                <a:solidFill>
-                  <a:schemeClr val="dk1"/>
-                </a:solidFill>
-                <a:latin typeface="Poppins"/>
-                <a:ea typeface="Poppins"/>
-                <a:cs typeface="Poppins"/>
-                <a:sym typeface="Poppins"/>
-              </a:defRPr>
-            </a:lvl1pPr>
-            <a:lvl2pPr marL="914400" marR="0" lvl="1" indent="-317500" algn="l" rtl="0">
-              <a:lnSpc>
-                <a:spcPct val="100000"/>
-              </a:lnSpc>
-              <a:spcBef>
-                <a:spcPts val="0"/>
-              </a:spcBef>
-              <a:spcAft>
-                <a:spcPts val="0"/>
-              </a:spcAft>
-              <a:buClr>
-                <a:schemeClr val="dk1"/>
-              </a:buClr>
-              <a:buSzPts val="1400"/>
-              <a:buFont typeface="Poppins"/>
-              <a:buNone/>
-              <a:defRPr sz="1400" b="0" i="0" u="none" strike="noStrike" cap="none">
-                <a:solidFill>
-                  <a:schemeClr val="dk1"/>
-                </a:solidFill>
-                <a:latin typeface="Poppins"/>
-                <a:ea typeface="Poppins"/>
-                <a:cs typeface="Poppins"/>
-                <a:sym typeface="Poppins"/>
-              </a:defRPr>
-            </a:lvl2pPr>
-            <a:lvl3pPr marL="1371600" marR="0" lvl="2" indent="-317500" algn="l" rtl="0">
-              <a:lnSpc>
-                <a:spcPct val="100000"/>
-              </a:lnSpc>
-              <a:spcBef>
-                <a:spcPts val="0"/>
-              </a:spcBef>
-              <a:spcAft>
-                <a:spcPts val="0"/>
-              </a:spcAft>
-              <a:buClr>
-                <a:schemeClr val="dk1"/>
-              </a:buClr>
-              <a:buSzPts val="1400"/>
-              <a:buFont typeface="Poppins"/>
-              <a:buNone/>
-              <a:defRPr sz="1400" b="0" i="0" u="none" strike="noStrike" cap="none">
-                <a:solidFill>
-                  <a:schemeClr val="dk1"/>
-                </a:solidFill>
-                <a:latin typeface="Poppins"/>
-                <a:ea typeface="Poppins"/>
-                <a:cs typeface="Poppins"/>
-                <a:sym typeface="Poppins"/>
-              </a:defRPr>
-            </a:lvl3pPr>
-            <a:lvl4pPr marL="1828800" marR="0" lvl="3" indent="-317500" algn="l" rtl="0">
-              <a:lnSpc>
-                <a:spcPct val="100000"/>
-              </a:lnSpc>
-              <a:spcBef>
-                <a:spcPts val="0"/>
-              </a:spcBef>
-              <a:spcAft>
-                <a:spcPts val="0"/>
-              </a:spcAft>
-              <a:buClr>
-                <a:schemeClr val="dk1"/>
-              </a:buClr>
-              <a:buSzPts val="1400"/>
-              <a:buFont typeface="Poppins"/>
-              <a:buNone/>
-              <a:defRPr sz="1400" b="0" i="0" u="none" strike="noStrike" cap="none">
-                <a:solidFill>
-                  <a:schemeClr val="dk1"/>
-                </a:solidFill>
-                <a:latin typeface="Poppins"/>
-                <a:ea typeface="Poppins"/>
-                <a:cs typeface="Poppins"/>
-                <a:sym typeface="Poppins"/>
-              </a:defRPr>
-            </a:lvl4pPr>
-            <a:lvl5pPr marL="2286000" marR="0" lvl="4" indent="-317500" algn="l" rtl="0">
-              <a:lnSpc>
-                <a:spcPct val="100000"/>
-              </a:lnSpc>
-              <a:spcBef>
-                <a:spcPts val="0"/>
-              </a:spcBef>
-              <a:spcAft>
-                <a:spcPts val="0"/>
-              </a:spcAft>
-              <a:buClr>
-                <a:schemeClr val="dk1"/>
-              </a:buClr>
-              <a:buSzPts val="1400"/>
-              <a:buFont typeface="Poppins"/>
-              <a:buNone/>
-              <a:defRPr sz="1400" b="0" i="0" u="none" strike="noStrike" cap="none">
-                <a:solidFill>
-                  <a:schemeClr val="dk1"/>
-                </a:solidFill>
-                <a:latin typeface="Poppins"/>
-                <a:ea typeface="Poppins"/>
-                <a:cs typeface="Poppins"/>
-                <a:sym typeface="Poppins"/>
-              </a:defRPr>
-            </a:lvl5pPr>
-            <a:lvl6pPr marL="2743200" marR="0" lvl="5" indent="-317500" algn="l" rtl="0">
-              <a:lnSpc>
-                <a:spcPct val="100000"/>
-              </a:lnSpc>
-              <a:spcBef>
-                <a:spcPts val="0"/>
-              </a:spcBef>
-              <a:spcAft>
-                <a:spcPts val="0"/>
-              </a:spcAft>
-              <a:buClr>
-                <a:schemeClr val="dk1"/>
-              </a:buClr>
-              <a:buSzPts val="1400"/>
-              <a:buFont typeface="Poppins"/>
-              <a:buNone/>
-              <a:defRPr sz="1400" b="0" i="0" u="none" strike="noStrike" cap="none">
-                <a:solidFill>
-                  <a:schemeClr val="dk1"/>
-                </a:solidFill>
-                <a:latin typeface="Poppins"/>
-                <a:ea typeface="Poppins"/>
-                <a:cs typeface="Poppins"/>
-                <a:sym typeface="Poppins"/>
-              </a:defRPr>
-            </a:lvl6pPr>
-            <a:lvl7pPr marL="3200400" marR="0" lvl="6" indent="-317500" algn="l" rtl="0">
-              <a:lnSpc>
-                <a:spcPct val="100000"/>
-              </a:lnSpc>
-              <a:spcBef>
-                <a:spcPts val="0"/>
-              </a:spcBef>
-              <a:spcAft>
-                <a:spcPts val="0"/>
-              </a:spcAft>
-              <a:buClr>
-                <a:schemeClr val="dk1"/>
-              </a:buClr>
-              <a:buSzPts val="1400"/>
-              <a:buFont typeface="Poppins"/>
-              <a:buNone/>
-              <a:defRPr sz="1400" b="0" i="0" u="none" strike="noStrike" cap="none">
-                <a:solidFill>
-                  <a:schemeClr val="dk1"/>
-                </a:solidFill>
-                <a:latin typeface="Poppins"/>
-                <a:ea typeface="Poppins"/>
-                <a:cs typeface="Poppins"/>
-                <a:sym typeface="Poppins"/>
-              </a:defRPr>
-            </a:lvl7pPr>
-            <a:lvl8pPr marL="3657600" marR="0" lvl="7" indent="-317500" algn="l" rtl="0">
-              <a:lnSpc>
-                <a:spcPct val="100000"/>
-              </a:lnSpc>
-              <a:spcBef>
-                <a:spcPts val="0"/>
-              </a:spcBef>
-              <a:spcAft>
-                <a:spcPts val="0"/>
-              </a:spcAft>
-              <a:buClr>
-                <a:schemeClr val="dk1"/>
-              </a:buClr>
-              <a:buSzPts val="1400"/>
-              <a:buFont typeface="Poppins"/>
-              <a:buNone/>
-              <a:defRPr sz="1400" b="0" i="0" u="none" strike="noStrike" cap="none">
-                <a:solidFill>
-                  <a:schemeClr val="dk1"/>
-                </a:solidFill>
-                <a:latin typeface="Poppins"/>
-                <a:ea typeface="Poppins"/>
-                <a:cs typeface="Poppins"/>
-                <a:sym typeface="Poppins"/>
-              </a:defRPr>
-            </a:lvl8pPr>
-            <a:lvl9pPr marL="4114800" marR="0" lvl="8" indent="-317500" algn="l" rtl="0">
-              <a:lnSpc>
-                <a:spcPct val="100000"/>
-              </a:lnSpc>
-              <a:spcBef>
-                <a:spcPts val="0"/>
-              </a:spcBef>
-              <a:spcAft>
-                <a:spcPts val="0"/>
-              </a:spcAft>
-              <a:buClr>
-                <a:schemeClr val="dk1"/>
-              </a:buClr>
-              <a:buSzPts val="1400"/>
-              <a:buFont typeface="Poppins"/>
-              <a:buNone/>
-              <a:defRPr sz="1400" b="0" i="0" u="none" strike="noStrike" cap="none">
-                <a:solidFill>
-                  <a:schemeClr val="dk1"/>
-                </a:solidFill>
-                <a:latin typeface="Poppins"/>
-                <a:ea typeface="Poppins"/>
-                <a:cs typeface="Poppins"/>
-                <a:sym typeface="Poppins"/>
-              </a:defRPr>
-            </a:lvl9pPr>
-          </a:lstStyle>
-          <a:p>
-            <a:pPr marL="285750" indent="-285750" algn="just">
-              <a:buFont typeface="Arial" panose="020B0604020202020204" pitchFamily="34" charset="0"/>
-              <a:buChar char="•"/>
-            </a:pPr>
-            <a:r>
-              <a:rPr lang="en-US" dirty="0">
-                <a:latin typeface="Inter"/>
-              </a:rPr>
-              <a:t>To classify this model, </a:t>
-            </a:r>
-            <a:r>
-              <a:rPr lang="en-US" b="1" dirty="0" err="1">
-                <a:latin typeface="Inter"/>
-              </a:rPr>
-              <a:t>KNeighborsClassifier</a:t>
-            </a:r>
-            <a:r>
-              <a:rPr lang="en-US" dirty="0">
-                <a:latin typeface="Inter"/>
-              </a:rPr>
-              <a:t> relative to the </a:t>
-            </a:r>
-            <a:r>
-              <a:rPr lang="en-US" b="1" dirty="0" err="1">
-                <a:latin typeface="Inter"/>
-              </a:rPr>
-              <a:t>sklearn.neighbors</a:t>
-            </a:r>
-            <a:r>
-              <a:rPr lang="en-US" b="1" dirty="0">
-                <a:latin typeface="Inter"/>
-              </a:rPr>
-              <a:t> </a:t>
-            </a:r>
-            <a:r>
-              <a:rPr lang="en-US" dirty="0">
-                <a:latin typeface="Inter"/>
-              </a:rPr>
-              <a:t>module was used. </a:t>
-            </a:r>
-          </a:p>
-          <a:p>
-            <a:pPr marL="285750" indent="-285750" algn="just">
-              <a:buFont typeface="Arial" panose="020B0604020202020204" pitchFamily="34" charset="0"/>
-              <a:buChar char="•"/>
-            </a:pPr>
-            <a:r>
-              <a:rPr lang="en-US" dirty="0" err="1">
-                <a:latin typeface="Inter"/>
-              </a:rPr>
-              <a:t>n_neighbors</a:t>
-            </a:r>
-            <a:r>
-              <a:rPr lang="en-US" dirty="0">
-                <a:latin typeface="Inter"/>
-              </a:rPr>
-              <a:t> = 5</a:t>
-            </a:r>
-            <a:endParaRPr lang="pt-PT" dirty="0">
-              <a:latin typeface="Inter"/>
-            </a:endParaRPr>
           </a:p>
         </p:txBody>
       </p:sp>
@@ -12895,7 +12032,7 @@
         <p:spPr>
           <a:xfrm>
             <a:off x="5136993" y="3453404"/>
-            <a:ext cx="3348916" cy="1423396"/>
+            <a:ext cx="3535946" cy="1423396"/>
           </a:xfrm>
           <a:prstGeom prst="rect">
             <a:avLst/>
@@ -13177,7 +12314,7 @@
               <a:rPr lang="en-US" dirty="0">
                 <a:latin typeface="Inter"/>
               </a:rPr>
-              <a:t> relative to the </a:t>
+              <a:t> from the </a:t>
             </a:r>
             <a:r>
               <a:rPr lang="en-US" b="1" dirty="0" err="1">
@@ -13233,6 +12370,668 @@
               </a:rPr>
               <a:t>: 1000</a:t>
             </a:r>
+          </a:p>
+        </p:txBody>
+      </p:sp>
+      <p:sp>
+        <p:nvSpPr>
+          <p:cNvPr id="6" name="Google Shape;242;p28">
+            <a:extLst>
+              <a:ext uri="{FF2B5EF4-FFF2-40B4-BE49-F238E27FC236}">
+                <a16:creationId xmlns:a16="http://schemas.microsoft.com/office/drawing/2014/main" id="{4F38ECF3-1458-F3AD-E4B3-DAF10854DBC0}"/>
+              </a:ext>
+            </a:extLst>
+          </p:cNvPr>
+          <p:cNvSpPr txBox="1">
+            <a:spLocks/>
+          </p:cNvSpPr>
+          <p:nvPr/>
+        </p:nvSpPr>
+        <p:spPr>
+          <a:xfrm>
+            <a:off x="5136993" y="1504397"/>
+            <a:ext cx="2869022" cy="371400"/>
+          </a:xfrm>
+          <a:prstGeom prst="rect">
+            <a:avLst/>
+          </a:prstGeom>
+          <a:noFill/>
+          <a:ln>
+            <a:noFill/>
+          </a:ln>
+        </p:spPr>
+        <p:txBody>
+          <a:bodyPr spcFirstLastPara="1" wrap="square" lIns="91425" tIns="91425" rIns="91425" bIns="91425" anchor="t" anchorCtr="0">
+            <a:noAutofit/>
+          </a:bodyPr>
+          <a:lstStyle>
+            <a:defPPr marR="0" lvl="0" algn="l" rtl="0">
+              <a:lnSpc>
+                <a:spcPct val="100000"/>
+              </a:lnSpc>
+              <a:spcBef>
+                <a:spcPts val="0"/>
+              </a:spcBef>
+              <a:spcAft>
+                <a:spcPts val="0"/>
+              </a:spcAft>
+            </a:defPPr>
+            <a:lvl1pPr marL="457200" marR="0" lvl="0" indent="-342900" algn="l" rtl="0">
+              <a:lnSpc>
+                <a:spcPct val="100000"/>
+              </a:lnSpc>
+              <a:spcBef>
+                <a:spcPts val="0"/>
+              </a:spcBef>
+              <a:spcAft>
+                <a:spcPts val="0"/>
+              </a:spcAft>
+              <a:buClr>
+                <a:schemeClr val="dk1"/>
+              </a:buClr>
+              <a:buSzPts val="1800"/>
+              <a:buFont typeface="Poppins"/>
+              <a:buNone/>
+              <a:defRPr sz="1800" b="0" i="0" u="none" strike="noStrike" cap="none">
+                <a:solidFill>
+                  <a:schemeClr val="dk1"/>
+                </a:solidFill>
+                <a:latin typeface="Poppins Black"/>
+                <a:ea typeface="Poppins Black"/>
+                <a:cs typeface="Poppins Black"/>
+                <a:sym typeface="Poppins Black"/>
+              </a:defRPr>
+            </a:lvl1pPr>
+            <a:lvl2pPr marL="914400" marR="0" lvl="1" indent="-317500" algn="l" rtl="0">
+              <a:lnSpc>
+                <a:spcPct val="100000"/>
+              </a:lnSpc>
+              <a:spcBef>
+                <a:spcPts val="1600"/>
+              </a:spcBef>
+              <a:spcAft>
+                <a:spcPts val="0"/>
+              </a:spcAft>
+              <a:buClr>
+                <a:schemeClr val="dk1"/>
+              </a:buClr>
+              <a:buSzPts val="1400"/>
+              <a:buFont typeface="Poppins"/>
+              <a:buNone/>
+              <a:defRPr sz="1400" b="0" i="0" u="none" strike="noStrike" cap="none">
+                <a:solidFill>
+                  <a:schemeClr val="dk1"/>
+                </a:solidFill>
+                <a:latin typeface="Poppins Black"/>
+                <a:ea typeface="Poppins Black"/>
+                <a:cs typeface="Poppins Black"/>
+                <a:sym typeface="Poppins Black"/>
+              </a:defRPr>
+            </a:lvl2pPr>
+            <a:lvl3pPr marL="1371600" marR="0" lvl="2" indent="-317500" algn="l" rtl="0">
+              <a:lnSpc>
+                <a:spcPct val="100000"/>
+              </a:lnSpc>
+              <a:spcBef>
+                <a:spcPts val="1600"/>
+              </a:spcBef>
+              <a:spcAft>
+                <a:spcPts val="0"/>
+              </a:spcAft>
+              <a:buClr>
+                <a:schemeClr val="dk1"/>
+              </a:buClr>
+              <a:buSzPts val="1400"/>
+              <a:buFont typeface="Poppins"/>
+              <a:buNone/>
+              <a:defRPr sz="1400" b="0" i="0" u="none" strike="noStrike" cap="none">
+                <a:solidFill>
+                  <a:schemeClr val="dk1"/>
+                </a:solidFill>
+                <a:latin typeface="Poppins Black"/>
+                <a:ea typeface="Poppins Black"/>
+                <a:cs typeface="Poppins Black"/>
+                <a:sym typeface="Poppins Black"/>
+              </a:defRPr>
+            </a:lvl3pPr>
+            <a:lvl4pPr marL="1828800" marR="0" lvl="3" indent="-317500" algn="l" rtl="0">
+              <a:lnSpc>
+                <a:spcPct val="100000"/>
+              </a:lnSpc>
+              <a:spcBef>
+                <a:spcPts val="1600"/>
+              </a:spcBef>
+              <a:spcAft>
+                <a:spcPts val="0"/>
+              </a:spcAft>
+              <a:buClr>
+                <a:schemeClr val="dk1"/>
+              </a:buClr>
+              <a:buSzPts val="1400"/>
+              <a:buFont typeface="Poppins"/>
+              <a:buNone/>
+              <a:defRPr sz="1400" b="0" i="0" u="none" strike="noStrike" cap="none">
+                <a:solidFill>
+                  <a:schemeClr val="dk1"/>
+                </a:solidFill>
+                <a:latin typeface="Poppins Black"/>
+                <a:ea typeface="Poppins Black"/>
+                <a:cs typeface="Poppins Black"/>
+                <a:sym typeface="Poppins Black"/>
+              </a:defRPr>
+            </a:lvl4pPr>
+            <a:lvl5pPr marL="2286000" marR="0" lvl="4" indent="-317500" algn="l" rtl="0">
+              <a:lnSpc>
+                <a:spcPct val="100000"/>
+              </a:lnSpc>
+              <a:spcBef>
+                <a:spcPts val="1600"/>
+              </a:spcBef>
+              <a:spcAft>
+                <a:spcPts val="0"/>
+              </a:spcAft>
+              <a:buClr>
+                <a:schemeClr val="dk1"/>
+              </a:buClr>
+              <a:buSzPts val="1400"/>
+              <a:buFont typeface="Poppins"/>
+              <a:buNone/>
+              <a:defRPr sz="1400" b="0" i="0" u="none" strike="noStrike" cap="none">
+                <a:solidFill>
+                  <a:schemeClr val="dk1"/>
+                </a:solidFill>
+                <a:latin typeface="Poppins Black"/>
+                <a:ea typeface="Poppins Black"/>
+                <a:cs typeface="Poppins Black"/>
+                <a:sym typeface="Poppins Black"/>
+              </a:defRPr>
+            </a:lvl5pPr>
+            <a:lvl6pPr marL="2743200" marR="0" lvl="5" indent="-317500" algn="l" rtl="0">
+              <a:lnSpc>
+                <a:spcPct val="100000"/>
+              </a:lnSpc>
+              <a:spcBef>
+                <a:spcPts val="1600"/>
+              </a:spcBef>
+              <a:spcAft>
+                <a:spcPts val="0"/>
+              </a:spcAft>
+              <a:buClr>
+                <a:schemeClr val="dk1"/>
+              </a:buClr>
+              <a:buSzPts val="1400"/>
+              <a:buFont typeface="Poppins"/>
+              <a:buNone/>
+              <a:defRPr sz="1400" b="0" i="0" u="none" strike="noStrike" cap="none">
+                <a:solidFill>
+                  <a:schemeClr val="dk1"/>
+                </a:solidFill>
+                <a:latin typeface="Poppins Black"/>
+                <a:ea typeface="Poppins Black"/>
+                <a:cs typeface="Poppins Black"/>
+                <a:sym typeface="Poppins Black"/>
+              </a:defRPr>
+            </a:lvl6pPr>
+            <a:lvl7pPr marL="3200400" marR="0" lvl="6" indent="-317500" algn="l" rtl="0">
+              <a:lnSpc>
+                <a:spcPct val="100000"/>
+              </a:lnSpc>
+              <a:spcBef>
+                <a:spcPts val="1600"/>
+              </a:spcBef>
+              <a:spcAft>
+                <a:spcPts val="0"/>
+              </a:spcAft>
+              <a:buClr>
+                <a:schemeClr val="dk1"/>
+              </a:buClr>
+              <a:buSzPts val="1400"/>
+              <a:buFont typeface="Poppins"/>
+              <a:buNone/>
+              <a:defRPr sz="1400" b="0" i="0" u="none" strike="noStrike" cap="none">
+                <a:solidFill>
+                  <a:schemeClr val="dk1"/>
+                </a:solidFill>
+                <a:latin typeface="Poppins Black"/>
+                <a:ea typeface="Poppins Black"/>
+                <a:cs typeface="Poppins Black"/>
+                <a:sym typeface="Poppins Black"/>
+              </a:defRPr>
+            </a:lvl7pPr>
+            <a:lvl8pPr marL="3657600" marR="0" lvl="7" indent="-317500" algn="l" rtl="0">
+              <a:lnSpc>
+                <a:spcPct val="100000"/>
+              </a:lnSpc>
+              <a:spcBef>
+                <a:spcPts val="1600"/>
+              </a:spcBef>
+              <a:spcAft>
+                <a:spcPts val="0"/>
+              </a:spcAft>
+              <a:buClr>
+                <a:schemeClr val="dk1"/>
+              </a:buClr>
+              <a:buSzPts val="1400"/>
+              <a:buFont typeface="Poppins"/>
+              <a:buNone/>
+              <a:defRPr sz="1400" b="0" i="0" u="none" strike="noStrike" cap="none">
+                <a:solidFill>
+                  <a:schemeClr val="dk1"/>
+                </a:solidFill>
+                <a:latin typeface="Poppins Black"/>
+                <a:ea typeface="Poppins Black"/>
+                <a:cs typeface="Poppins Black"/>
+                <a:sym typeface="Poppins Black"/>
+              </a:defRPr>
+            </a:lvl8pPr>
+            <a:lvl9pPr marL="4114800" marR="0" lvl="8" indent="-317500" algn="l" rtl="0">
+              <a:lnSpc>
+                <a:spcPct val="100000"/>
+              </a:lnSpc>
+              <a:spcBef>
+                <a:spcPts val="1600"/>
+              </a:spcBef>
+              <a:spcAft>
+                <a:spcPts val="1600"/>
+              </a:spcAft>
+              <a:buClr>
+                <a:schemeClr val="dk1"/>
+              </a:buClr>
+              <a:buSzPts val="1400"/>
+              <a:buFont typeface="Poppins"/>
+              <a:buNone/>
+              <a:defRPr sz="1400" b="0" i="0" u="none" strike="noStrike" cap="none">
+                <a:solidFill>
+                  <a:schemeClr val="dk1"/>
+                </a:solidFill>
+                <a:latin typeface="Poppins Black"/>
+                <a:ea typeface="Poppins Black"/>
+                <a:cs typeface="Poppins Black"/>
+                <a:sym typeface="Poppins Black"/>
+              </a:defRPr>
+            </a:lvl9pPr>
+          </a:lstStyle>
+          <a:p>
+            <a:pPr marL="0" indent="0">
+              <a:spcAft>
+                <a:spcPts val="1600"/>
+              </a:spcAft>
+            </a:pPr>
+            <a:r>
+              <a:rPr lang="pt-PT" dirty="0">
+                <a:latin typeface="Poppins" panose="00000500000000000000" pitchFamily="2" charset="0"/>
+                <a:cs typeface="Poppins" panose="00000500000000000000" pitchFamily="2" charset="0"/>
+              </a:rPr>
+              <a:t>K-</a:t>
+            </a:r>
+            <a:r>
+              <a:rPr lang="pt-PT" dirty="0" err="1">
+                <a:latin typeface="Poppins" panose="00000500000000000000" pitchFamily="2" charset="0"/>
+                <a:cs typeface="Poppins" panose="00000500000000000000" pitchFamily="2" charset="0"/>
+              </a:rPr>
+              <a:t>Nearest</a:t>
+            </a:r>
+            <a:r>
+              <a:rPr lang="pt-PT" dirty="0">
+                <a:latin typeface="Poppins" panose="00000500000000000000" pitchFamily="2" charset="0"/>
+                <a:cs typeface="Poppins" panose="00000500000000000000" pitchFamily="2" charset="0"/>
+              </a:rPr>
+              <a:t> </a:t>
+            </a:r>
+            <a:r>
+              <a:rPr lang="pt-PT" dirty="0" err="1">
+                <a:latin typeface="Poppins" panose="00000500000000000000" pitchFamily="2" charset="0"/>
+                <a:cs typeface="Poppins" panose="00000500000000000000" pitchFamily="2" charset="0"/>
+              </a:rPr>
+              <a:t>Neightbours</a:t>
+            </a:r>
+            <a:endParaRPr lang="pt-PT" dirty="0">
+              <a:latin typeface="Poppins" panose="00000500000000000000" pitchFamily="2" charset="0"/>
+              <a:cs typeface="Poppins" panose="00000500000000000000" pitchFamily="2" charset="0"/>
+            </a:endParaRPr>
+          </a:p>
+        </p:txBody>
+      </p:sp>
+      <p:sp>
+        <p:nvSpPr>
+          <p:cNvPr id="9" name="Google Shape;244;p28">
+            <a:extLst>
+              <a:ext uri="{FF2B5EF4-FFF2-40B4-BE49-F238E27FC236}">
+                <a16:creationId xmlns:a16="http://schemas.microsoft.com/office/drawing/2014/main" id="{B7943EA1-DE71-5FC8-CD78-6718134E9072}"/>
+              </a:ext>
+            </a:extLst>
+          </p:cNvPr>
+          <p:cNvSpPr txBox="1">
+            <a:spLocks/>
+          </p:cNvSpPr>
+          <p:nvPr/>
+        </p:nvSpPr>
+        <p:spPr>
+          <a:xfrm>
+            <a:off x="5136994" y="1855920"/>
+            <a:ext cx="3667570" cy="1209555"/>
+          </a:xfrm>
+          <a:prstGeom prst="rect">
+            <a:avLst/>
+          </a:prstGeom>
+          <a:noFill/>
+          <a:ln>
+            <a:noFill/>
+          </a:ln>
+        </p:spPr>
+        <p:txBody>
+          <a:bodyPr spcFirstLastPara="1" wrap="square" lIns="91425" tIns="91425" rIns="91425" bIns="91425" anchor="t" anchorCtr="0">
+            <a:noAutofit/>
+          </a:bodyPr>
+          <a:lstStyle>
+            <a:defPPr marR="0" lvl="0" algn="l" rtl="0">
+              <a:lnSpc>
+                <a:spcPct val="100000"/>
+              </a:lnSpc>
+              <a:spcBef>
+                <a:spcPts val="0"/>
+              </a:spcBef>
+              <a:spcAft>
+                <a:spcPts val="0"/>
+              </a:spcAft>
+            </a:defPPr>
+            <a:lvl1pPr marL="457200" marR="0" lvl="0" indent="-342900" algn="l" rtl="0">
+              <a:lnSpc>
+                <a:spcPct val="100000"/>
+              </a:lnSpc>
+              <a:spcBef>
+                <a:spcPts val="0"/>
+              </a:spcBef>
+              <a:spcAft>
+                <a:spcPts val="0"/>
+              </a:spcAft>
+              <a:buClr>
+                <a:schemeClr val="dk1"/>
+              </a:buClr>
+              <a:buSzPts val="1800"/>
+              <a:buFont typeface="Poppins"/>
+              <a:buNone/>
+              <a:defRPr sz="1400" b="0" i="0" u="none" strike="noStrike" cap="none">
+                <a:solidFill>
+                  <a:schemeClr val="dk1"/>
+                </a:solidFill>
+                <a:latin typeface="Poppins"/>
+                <a:ea typeface="Poppins"/>
+                <a:cs typeface="Poppins"/>
+                <a:sym typeface="Poppins"/>
+              </a:defRPr>
+            </a:lvl1pPr>
+            <a:lvl2pPr marL="914400" marR="0" lvl="1" indent="-317500" algn="l" rtl="0">
+              <a:lnSpc>
+                <a:spcPct val="100000"/>
+              </a:lnSpc>
+              <a:spcBef>
+                <a:spcPts val="0"/>
+              </a:spcBef>
+              <a:spcAft>
+                <a:spcPts val="0"/>
+              </a:spcAft>
+              <a:buClr>
+                <a:schemeClr val="dk1"/>
+              </a:buClr>
+              <a:buSzPts val="1400"/>
+              <a:buFont typeface="Poppins"/>
+              <a:buNone/>
+              <a:defRPr sz="1400" b="0" i="0" u="none" strike="noStrike" cap="none">
+                <a:solidFill>
+                  <a:schemeClr val="dk1"/>
+                </a:solidFill>
+                <a:latin typeface="Poppins"/>
+                <a:ea typeface="Poppins"/>
+                <a:cs typeface="Poppins"/>
+                <a:sym typeface="Poppins"/>
+              </a:defRPr>
+            </a:lvl2pPr>
+            <a:lvl3pPr marL="1371600" marR="0" lvl="2" indent="-317500" algn="l" rtl="0">
+              <a:lnSpc>
+                <a:spcPct val="100000"/>
+              </a:lnSpc>
+              <a:spcBef>
+                <a:spcPts val="0"/>
+              </a:spcBef>
+              <a:spcAft>
+                <a:spcPts val="0"/>
+              </a:spcAft>
+              <a:buClr>
+                <a:schemeClr val="dk1"/>
+              </a:buClr>
+              <a:buSzPts val="1400"/>
+              <a:buFont typeface="Poppins"/>
+              <a:buNone/>
+              <a:defRPr sz="1400" b="0" i="0" u="none" strike="noStrike" cap="none">
+                <a:solidFill>
+                  <a:schemeClr val="dk1"/>
+                </a:solidFill>
+                <a:latin typeface="Poppins"/>
+                <a:ea typeface="Poppins"/>
+                <a:cs typeface="Poppins"/>
+                <a:sym typeface="Poppins"/>
+              </a:defRPr>
+            </a:lvl3pPr>
+            <a:lvl4pPr marL="1828800" marR="0" lvl="3" indent="-317500" algn="l" rtl="0">
+              <a:lnSpc>
+                <a:spcPct val="100000"/>
+              </a:lnSpc>
+              <a:spcBef>
+                <a:spcPts val="0"/>
+              </a:spcBef>
+              <a:spcAft>
+                <a:spcPts val="0"/>
+              </a:spcAft>
+              <a:buClr>
+                <a:schemeClr val="dk1"/>
+              </a:buClr>
+              <a:buSzPts val="1400"/>
+              <a:buFont typeface="Poppins"/>
+              <a:buNone/>
+              <a:defRPr sz="1400" b="0" i="0" u="none" strike="noStrike" cap="none">
+                <a:solidFill>
+                  <a:schemeClr val="dk1"/>
+                </a:solidFill>
+                <a:latin typeface="Poppins"/>
+                <a:ea typeface="Poppins"/>
+                <a:cs typeface="Poppins"/>
+                <a:sym typeface="Poppins"/>
+              </a:defRPr>
+            </a:lvl4pPr>
+            <a:lvl5pPr marL="2286000" marR="0" lvl="4" indent="-317500" algn="l" rtl="0">
+              <a:lnSpc>
+                <a:spcPct val="100000"/>
+              </a:lnSpc>
+              <a:spcBef>
+                <a:spcPts val="0"/>
+              </a:spcBef>
+              <a:spcAft>
+                <a:spcPts val="0"/>
+              </a:spcAft>
+              <a:buClr>
+                <a:schemeClr val="dk1"/>
+              </a:buClr>
+              <a:buSzPts val="1400"/>
+              <a:buFont typeface="Poppins"/>
+              <a:buNone/>
+              <a:defRPr sz="1400" b="0" i="0" u="none" strike="noStrike" cap="none">
+                <a:solidFill>
+                  <a:schemeClr val="dk1"/>
+                </a:solidFill>
+                <a:latin typeface="Poppins"/>
+                <a:ea typeface="Poppins"/>
+                <a:cs typeface="Poppins"/>
+                <a:sym typeface="Poppins"/>
+              </a:defRPr>
+            </a:lvl5pPr>
+            <a:lvl6pPr marL="2743200" marR="0" lvl="5" indent="-317500" algn="l" rtl="0">
+              <a:lnSpc>
+                <a:spcPct val="100000"/>
+              </a:lnSpc>
+              <a:spcBef>
+                <a:spcPts val="0"/>
+              </a:spcBef>
+              <a:spcAft>
+                <a:spcPts val="0"/>
+              </a:spcAft>
+              <a:buClr>
+                <a:schemeClr val="dk1"/>
+              </a:buClr>
+              <a:buSzPts val="1400"/>
+              <a:buFont typeface="Poppins"/>
+              <a:buNone/>
+              <a:defRPr sz="1400" b="0" i="0" u="none" strike="noStrike" cap="none">
+                <a:solidFill>
+                  <a:schemeClr val="dk1"/>
+                </a:solidFill>
+                <a:latin typeface="Poppins"/>
+                <a:ea typeface="Poppins"/>
+                <a:cs typeface="Poppins"/>
+                <a:sym typeface="Poppins"/>
+              </a:defRPr>
+            </a:lvl6pPr>
+            <a:lvl7pPr marL="3200400" marR="0" lvl="6" indent="-317500" algn="l" rtl="0">
+              <a:lnSpc>
+                <a:spcPct val="100000"/>
+              </a:lnSpc>
+              <a:spcBef>
+                <a:spcPts val="0"/>
+              </a:spcBef>
+              <a:spcAft>
+                <a:spcPts val="0"/>
+              </a:spcAft>
+              <a:buClr>
+                <a:schemeClr val="dk1"/>
+              </a:buClr>
+              <a:buSzPts val="1400"/>
+              <a:buFont typeface="Poppins"/>
+              <a:buNone/>
+              <a:defRPr sz="1400" b="0" i="0" u="none" strike="noStrike" cap="none">
+                <a:solidFill>
+                  <a:schemeClr val="dk1"/>
+                </a:solidFill>
+                <a:latin typeface="Poppins"/>
+                <a:ea typeface="Poppins"/>
+                <a:cs typeface="Poppins"/>
+                <a:sym typeface="Poppins"/>
+              </a:defRPr>
+            </a:lvl7pPr>
+            <a:lvl8pPr marL="3657600" marR="0" lvl="7" indent="-317500" algn="l" rtl="0">
+              <a:lnSpc>
+                <a:spcPct val="100000"/>
+              </a:lnSpc>
+              <a:spcBef>
+                <a:spcPts val="0"/>
+              </a:spcBef>
+              <a:spcAft>
+                <a:spcPts val="0"/>
+              </a:spcAft>
+              <a:buClr>
+                <a:schemeClr val="dk1"/>
+              </a:buClr>
+              <a:buSzPts val="1400"/>
+              <a:buFont typeface="Poppins"/>
+              <a:buNone/>
+              <a:defRPr sz="1400" b="0" i="0" u="none" strike="noStrike" cap="none">
+                <a:solidFill>
+                  <a:schemeClr val="dk1"/>
+                </a:solidFill>
+                <a:latin typeface="Poppins"/>
+                <a:ea typeface="Poppins"/>
+                <a:cs typeface="Poppins"/>
+                <a:sym typeface="Poppins"/>
+              </a:defRPr>
+            </a:lvl8pPr>
+            <a:lvl9pPr marL="4114800" marR="0" lvl="8" indent="-317500" algn="l" rtl="0">
+              <a:lnSpc>
+                <a:spcPct val="100000"/>
+              </a:lnSpc>
+              <a:spcBef>
+                <a:spcPts val="0"/>
+              </a:spcBef>
+              <a:spcAft>
+                <a:spcPts val="0"/>
+              </a:spcAft>
+              <a:buClr>
+                <a:schemeClr val="dk1"/>
+              </a:buClr>
+              <a:buSzPts val="1400"/>
+              <a:buFont typeface="Poppins"/>
+              <a:buNone/>
+              <a:defRPr sz="1400" b="0" i="0" u="none" strike="noStrike" cap="none">
+                <a:solidFill>
+                  <a:schemeClr val="dk1"/>
+                </a:solidFill>
+                <a:latin typeface="Poppins"/>
+                <a:ea typeface="Poppins"/>
+                <a:cs typeface="Poppins"/>
+                <a:sym typeface="Poppins"/>
+              </a:defRPr>
+            </a:lvl9pPr>
+          </a:lstStyle>
+          <a:p>
+            <a:pPr marL="285750" indent="-285750" algn="just">
+              <a:buFont typeface="Arial" panose="020B0604020202020204" pitchFamily="34" charset="0"/>
+              <a:buChar char="•"/>
+            </a:pPr>
+            <a:r>
+              <a:rPr lang="en-US" dirty="0">
+                <a:latin typeface="Inter"/>
+              </a:rPr>
+              <a:t>This model was based on the implementation of the </a:t>
+            </a:r>
+            <a:r>
+              <a:rPr lang="en-US" b="1" dirty="0" err="1">
+                <a:latin typeface="Inter"/>
+              </a:rPr>
+              <a:t>KNeighborsClassifier</a:t>
+            </a:r>
+            <a:r>
+              <a:rPr lang="en-US" dirty="0">
+                <a:latin typeface="Inter"/>
+              </a:rPr>
+              <a:t> from the </a:t>
+            </a:r>
+            <a:r>
+              <a:rPr lang="en-US" b="1" dirty="0" err="1">
+                <a:latin typeface="Inter"/>
+              </a:rPr>
+              <a:t>sklearn.neighbors</a:t>
+            </a:r>
+            <a:r>
+              <a:rPr lang="en-US" b="1" dirty="0">
+                <a:latin typeface="Inter"/>
+              </a:rPr>
+              <a:t> </a:t>
+            </a:r>
+            <a:r>
+              <a:rPr lang="en-US" dirty="0">
+                <a:latin typeface="Inter"/>
+              </a:rPr>
+              <a:t>module.</a:t>
+            </a:r>
+          </a:p>
+          <a:p>
+            <a:pPr marL="285750" indent="-285750" algn="just">
+              <a:buFont typeface="Arial" panose="020B0604020202020204" pitchFamily="34" charset="0"/>
+              <a:buChar char="•"/>
+            </a:pPr>
+            <a:r>
+              <a:rPr lang="en-US" dirty="0" err="1">
+                <a:latin typeface="Inter"/>
+              </a:rPr>
+              <a:t>n_neighbors</a:t>
+            </a:r>
+            <a:r>
+              <a:rPr lang="en-US" dirty="0">
+                <a:latin typeface="Inter"/>
+              </a:rPr>
+              <a:t> = 5</a:t>
+            </a:r>
+            <a:endParaRPr lang="pt-PT" dirty="0">
+              <a:latin typeface="Inter"/>
+            </a:endParaRPr>
           </a:p>
         </p:txBody>
       </p:sp>

</xml_diff>